<commit_message>
module 6 changes made
</commit_message>
<xml_diff>
--- a/Complimentary Course Content/Module6/Lessons/Module6_Lesson1 What is Iot Lecture.pptx
+++ b/Complimentary Course Content/Module6/Lessons/Module6_Lesson1 What is Iot Lecture.pptx
@@ -148,20 +148,6 @@
 </p:cmAuthorLst>
 </file>
 
-<file path=ppt/comments/comment1.xml><?xml version="1.0" encoding="utf-8"?>
-<p:cmLst xmlns:a="http://schemas.openxmlformats.org/drawingml/2006/main" xmlns:r="http://schemas.openxmlformats.org/officeDocument/2006/relationships" xmlns:p="http://schemas.openxmlformats.org/presentationml/2006/main">
-  <p:cm authorId="1" dt="2016-05-05T11:21:04.650" idx="1">
-    <p:pos x="10" y="-3"/>
-    <p:text>Should quantify data</p:text>
-    <p:extLst mod="1">
-      <p:ext uri="{C676402C-5697-4E1C-873F-D02D1690AC5C}">
-        <p15:threadingInfo xmlns:p15="http://schemas.microsoft.com/office/powerpoint/2012/main" timeZoneBias="420"/>
-      </p:ext>
-    </p:extLst>
-  </p:cm>
-</p:cmLst>
-</file>
-
 <file path=ppt/notesMasters/notesMaster1.xml><?xml version="1.0" encoding="utf-8"?>
 <p:notesMaster xmlns:a="http://schemas.openxmlformats.org/drawingml/2006/main" xmlns:r="http://schemas.openxmlformats.org/officeDocument/2006/relationships" xmlns:p="http://schemas.openxmlformats.org/presentationml/2006/main">
   <p:cSld>
@@ -244,7 +230,7 @@
           <a:p>
             <a:fld id="{49B60EF2-7028-489F-85D8-FE86CD7CF2A0}" type="datetimeFigureOut">
               <a:rPr lang="en-US" smtClean="0"/>
-              <a:t>6/7/16</a:t>
+              <a:t>7/7/16</a:t>
             </a:fld>
             <a:endParaRPr lang="en-US"/>
           </a:p>
@@ -4228,7 +4214,7 @@
           <a:p>
             <a:fld id="{0459C166-16D3-4A25-A2F8-C51E0E346B22}" type="datetimeFigureOut">
               <a:rPr lang="en-US" smtClean="0"/>
-              <a:t>6/7/16</a:t>
+              <a:t>7/7/16</a:t>
             </a:fld>
             <a:endParaRPr lang="en-US"/>
           </a:p>
@@ -4592,7 +4578,7 @@
           <a:p>
             <a:fld id="{0459C166-16D3-4A25-A2F8-C51E0E346B22}" type="datetimeFigureOut">
               <a:rPr lang="en-US" smtClean="0"/>
-              <a:t>6/7/16</a:t>
+              <a:t>7/7/16</a:t>
             </a:fld>
             <a:endParaRPr lang="en-US"/>
           </a:p>
@@ -4709,7 +4695,7 @@
           <a:p>
             <a:fld id="{0459C166-16D3-4A25-A2F8-C51E0E346B22}" type="datetimeFigureOut">
               <a:rPr lang="en-US" smtClean="0"/>
-              <a:t>6/7/16</a:t>
+              <a:t>7/7/16</a:t>
             </a:fld>
             <a:endParaRPr lang="en-US"/>
           </a:p>
@@ -4804,7 +4790,7 @@
           <a:p>
             <a:fld id="{0459C166-16D3-4A25-A2F8-C51E0E346B22}" type="datetimeFigureOut">
               <a:rPr lang="en-US" smtClean="0"/>
-              <a:t>6/7/16</a:t>
+              <a:t>7/7/16</a:t>
             </a:fld>
             <a:endParaRPr lang="en-US"/>
           </a:p>
@@ -5079,7 +5065,7 @@
           <a:p>
             <a:fld id="{0459C166-16D3-4A25-A2F8-C51E0E346B22}" type="datetimeFigureOut">
               <a:rPr lang="en-US" smtClean="0"/>
-              <a:t>6/7/16</a:t>
+              <a:t>7/7/16</a:t>
             </a:fld>
             <a:endParaRPr lang="en-US"/>
           </a:p>
@@ -5331,7 +5317,7 @@
           <a:p>
             <a:fld id="{0459C166-16D3-4A25-A2F8-C51E0E346B22}" type="datetimeFigureOut">
               <a:rPr lang="en-US" smtClean="0"/>
-              <a:t>6/7/16</a:t>
+              <a:t>7/7/16</a:t>
             </a:fld>
             <a:endParaRPr lang="en-US"/>
           </a:p>
@@ -5499,7 +5485,7 @@
           <a:p>
             <a:fld id="{0459C166-16D3-4A25-A2F8-C51E0E346B22}" type="datetimeFigureOut">
               <a:rPr lang="en-US" smtClean="0"/>
-              <a:t>6/7/16</a:t>
+              <a:t>7/7/16</a:t>
             </a:fld>
             <a:endParaRPr lang="en-US"/>
           </a:p>
@@ -5677,7 +5663,7 @@
           <a:p>
             <a:fld id="{0459C166-16D3-4A25-A2F8-C51E0E346B22}" type="datetimeFigureOut">
               <a:rPr lang="en-US" smtClean="0"/>
-              <a:t>6/7/16</a:t>
+              <a:t>7/7/16</a:t>
             </a:fld>
             <a:endParaRPr lang="en-US"/>
           </a:p>
@@ -6560,7 +6546,7 @@
           <a:p>
             <a:fld id="{0459C166-16D3-4A25-A2F8-C51E0E346B22}" type="datetimeFigureOut">
               <a:rPr lang="en-US" smtClean="0"/>
-              <a:t>6/7/16</a:t>
+              <a:t>7/7/16</a:t>
             </a:fld>
             <a:endParaRPr lang="en-US"/>
           </a:p>
@@ -12080,7 +12066,7 @@
             <a:fld id="{0459C166-16D3-4A25-A2F8-C51E0E346B22}" type="datetimeFigureOut">
               <a:rPr lang="en-US" smtClean="0"/>
               <a:pPr/>
-              <a:t>6/7/16</a:t>
+              <a:t>7/7/16</a:t>
             </a:fld>
             <a:endParaRPr lang="en-US"/>
           </a:p>
@@ -16360,7 +16346,7 @@
             <a:fld id="{A06E70C3-0867-4119-BCBD-AB49558914A9}" type="datetimeFigureOut">
               <a:rPr lang="en-US" smtClean="0"/>
               <a:pPr/>
-              <a:t>6/7/16</a:t>
+              <a:t>7/7/16</a:t>
             </a:fld>
             <a:endParaRPr lang="en-US"/>
           </a:p>
@@ -16660,7 +16646,7 @@
           <a:p>
             <a:fld id="{0459C166-16D3-4A25-A2F8-C51E0E346B22}" type="datetimeFigureOut">
               <a:rPr lang="en-US" smtClean="0"/>
-              <a:t>6/7/16</a:t>
+              <a:t>7/7/16</a:t>
             </a:fld>
             <a:endParaRPr lang="en-US"/>
           </a:p>
@@ -16937,7 +16923,7 @@
           <a:p>
             <a:fld id="{0459C166-16D3-4A25-A2F8-C51E0E346B22}" type="datetimeFigureOut">
               <a:rPr lang="en-US" smtClean="0"/>
-              <a:t>6/7/16</a:t>
+              <a:t>7/7/16</a:t>
             </a:fld>
             <a:endParaRPr lang="en-US"/>
           </a:p>
@@ -17924,7 +17910,7 @@
           <a:p>
             <a:fld id="{0459C166-16D3-4A25-A2F8-C51E0E346B22}" type="datetimeFigureOut">
               <a:rPr lang="en-US" smtClean="0"/>
-              <a:t>6/7/16</a:t>
+              <a:t>7/7/16</a:t>
             </a:fld>
             <a:endParaRPr lang="en-US"/>
           </a:p>
@@ -18135,7 +18121,7 @@
           <a:p>
             <a:fld id="{0459C166-16D3-4A25-A2F8-C51E0E346B22}" type="datetimeFigureOut">
               <a:rPr lang="en-US" smtClean="0"/>
-              <a:t>6/7/16</a:t>
+              <a:t>7/7/16</a:t>
             </a:fld>
             <a:endParaRPr lang="en-US"/>
           </a:p>
@@ -20652,11 +20638,6 @@
                 </a:rPr>
                 <a:t>Sensor fusion</a:t>
               </a:r>
-              <a:endParaRPr lang="en-US" sz="2800" dirty="0">
-                <a:solidFill>
-                  <a:schemeClr val="bg1"/>
-                </a:solidFill>
-              </a:endParaRPr>
             </a:p>
           </p:txBody>
         </p:sp>
@@ -20971,7 +20952,7 @@
           <p:nvPr>
             <p:extLst>
               <p:ext uri="{D42A27DB-BD31-4B8C-83A1-F6EECF244321}">
-                <p14:modId xmlns:p14="http://schemas.microsoft.com/office/powerpoint/2010/main" val="2430660700"/>
+                <p14:modId xmlns:p14="http://schemas.microsoft.com/office/powerpoint/2010/main" val="4036080142"/>
               </p:ext>
             </p:extLst>
           </p:nvPr>
@@ -21010,7 +20991,7 @@
                     <a:p>
                       <a:pPr marL="0" algn="ctr" defTabSz="914400" rtl="0" eaLnBrk="1" latinLnBrk="0" hangingPunct="1"/>
                       <a:r>
-                        <a:rPr lang="en-US" sz="2400" b="0" kern="1200" dirty="0">
+                        <a:rPr lang="en-US" sz="2400" b="1" kern="1200" dirty="0">
                           <a:solidFill>
                             <a:schemeClr val="bg1"/>
                           </a:solidFill>
@@ -21064,7 +21045,7 @@
                     <a:p>
                       <a:pPr algn="ctr"/>
                       <a:r>
-                        <a:rPr lang="en-US" sz="2000" b="0" dirty="0"/>
+                        <a:rPr lang="en-US" sz="2000" b="1" dirty="0"/>
                         <a:t>Light</a:t>
                       </a:r>
                     </a:p>
@@ -21116,7 +21097,7 @@
                     <a:p>
                       <a:pPr algn="ctr"/>
                       <a:r>
-                        <a:rPr lang="en-US" sz="2000" b="0" dirty="0"/>
+                        <a:rPr lang="en-US" sz="2000" b="1" dirty="0"/>
                         <a:t>Audio</a:t>
                       </a:r>
                     </a:p>
@@ -21163,7 +21144,7 @@
                     <a:p>
                       <a:pPr algn="ctr"/>
                       <a:r>
-                        <a:rPr lang="en-US" sz="2000" b="0" dirty="0"/>
+                        <a:rPr lang="en-US" sz="2000" b="1" dirty="0"/>
                         <a:t>Motion, Acceleration</a:t>
                       </a:r>
                     </a:p>
@@ -21210,7 +21191,7 @@
                     <a:p>
                       <a:pPr algn="ctr"/>
                       <a:r>
-                        <a:rPr lang="en-US" sz="2000" b="0" dirty="0"/>
+                        <a:rPr lang="en-US" sz="2000" b="1" dirty="0"/>
                         <a:t>Location</a:t>
                       </a:r>
                     </a:p>
@@ -21262,7 +21243,7 @@
                     <a:p>
                       <a:pPr algn="ctr"/>
                       <a:r>
-                        <a:rPr lang="en-US" sz="2000" b="0" dirty="0"/>
+                        <a:rPr lang="en-US" sz="2000" b="1" dirty="0"/>
                         <a:t>Physical attributes</a:t>
                       </a:r>
                     </a:p>
@@ -21498,7 +21479,7 @@
           <p:nvPr>
             <p:extLst>
               <p:ext uri="{D42A27DB-BD31-4B8C-83A1-F6EECF244321}">
-                <p14:modId xmlns:p14="http://schemas.microsoft.com/office/powerpoint/2010/main" val="556391448"/>
+                <p14:modId xmlns:p14="http://schemas.microsoft.com/office/powerpoint/2010/main" val="3149245001"/>
               </p:ext>
             </p:extLst>
           </p:nvPr>
@@ -21537,14 +21518,14 @@
                     <a:p>
                       <a:pPr algn="ctr"/>
                       <a:r>
-                        <a:rPr lang="en-US" b="0" dirty="0" smtClean="0">
+                        <a:rPr lang="en-US" b="1" dirty="0" smtClean="0">
                           <a:solidFill>
                             <a:schemeClr val="bg1"/>
                           </a:solidFill>
                         </a:rPr>
                         <a:t>Attribute</a:t>
                       </a:r>
-                      <a:endParaRPr lang="en-US" b="0" dirty="0">
+                      <a:endParaRPr lang="en-US" b="1" dirty="0">
                         <a:solidFill>
                           <a:schemeClr val="bg1"/>
                         </a:solidFill>
@@ -21598,10 +21579,10 @@
                     <a:p>
                       <a:pPr algn="l"/>
                       <a:r>
-                        <a:rPr lang="en-US" dirty="0" smtClean="0"/>
+                        <a:rPr lang="en-US" b="1" dirty="0" smtClean="0"/>
                         <a:t>Location</a:t>
                       </a:r>
-                      <a:endParaRPr lang="en-US" dirty="0"/>
+                      <a:endParaRPr lang="en-US" b="1" dirty="0"/>
                     </a:p>
                   </a:txBody>
                   <a:tcPr>
@@ -21651,10 +21632,10 @@
                     <a:p>
                       <a:pPr algn="l"/>
                       <a:r>
-                        <a:rPr lang="en-US" dirty="0" smtClean="0"/>
+                        <a:rPr lang="en-US" b="1" dirty="0" smtClean="0"/>
                         <a:t>Identify</a:t>
                       </a:r>
-                      <a:endParaRPr lang="en-US" dirty="0"/>
+                      <a:endParaRPr lang="en-US" b="1" dirty="0"/>
                     </a:p>
                   </a:txBody>
                   <a:tcPr>
@@ -21700,10 +21681,10 @@
                     <a:p>
                       <a:pPr algn="l"/>
                       <a:r>
-                        <a:rPr lang="en-US" dirty="0" smtClean="0"/>
+                        <a:rPr lang="en-US" b="1" dirty="0" smtClean="0"/>
                         <a:t>Activity</a:t>
                       </a:r>
-                      <a:endParaRPr lang="en-US" dirty="0"/>
+                      <a:endParaRPr lang="en-US" b="1" dirty="0"/>
                     </a:p>
                   </a:txBody>
                   <a:tcPr>
@@ -21749,10 +21730,10 @@
                     <a:p>
                       <a:pPr algn="l"/>
                       <a:r>
-                        <a:rPr lang="en-US" dirty="0" smtClean="0"/>
+                        <a:rPr lang="en-US" b="1" dirty="0" smtClean="0"/>
                         <a:t>Time</a:t>
                       </a:r>
-                      <a:endParaRPr lang="en-US" dirty="0"/>
+                      <a:endParaRPr lang="en-US" b="1" dirty="0"/>
                     </a:p>
                   </a:txBody>
                   <a:tcPr>
@@ -22588,7 +22569,7 @@
           <p:nvPr>
             <p:extLst>
               <p:ext uri="{D42A27DB-BD31-4B8C-83A1-F6EECF244321}">
-                <p14:modId xmlns:p14="http://schemas.microsoft.com/office/powerpoint/2010/main" val="2449365471"/>
+                <p14:modId xmlns:p14="http://schemas.microsoft.com/office/powerpoint/2010/main" val="3872684272"/>
               </p:ext>
             </p:extLst>
           </p:nvPr>
@@ -22627,7 +22608,7 @@
                     <a:p>
                       <a:pPr algn="ctr"/>
                       <a:r>
-                        <a:rPr lang="en-US" b="0" dirty="0" smtClean="0">
+                        <a:rPr lang="en-US" b="1" dirty="0" smtClean="0">
                           <a:solidFill>
                             <a:schemeClr val="bg1"/>
                           </a:solidFill>
@@ -22635,14 +22616,14 @@
                         <a:t>Location</a:t>
                       </a:r>
                       <a:r>
-                        <a:rPr lang="en-US" b="0" baseline="0" dirty="0" smtClean="0">
+                        <a:rPr lang="en-US" b="1" baseline="0" dirty="0" smtClean="0">
                           <a:solidFill>
                             <a:schemeClr val="bg1"/>
                           </a:solidFill>
                         </a:rPr>
                         <a:t> Sensing</a:t>
                       </a:r>
-                      <a:endParaRPr lang="en-US" b="0" dirty="0">
+                      <a:endParaRPr lang="en-US" b="1" dirty="0">
                         <a:solidFill>
                           <a:schemeClr val="bg1"/>
                         </a:solidFill>
@@ -22696,14 +22677,14 @@
                     <a:p>
                       <a:pPr algn="l"/>
                       <a:r>
-                        <a:rPr lang="en-US" dirty="0" smtClean="0"/>
+                        <a:rPr lang="en-US" b="1" dirty="0" smtClean="0"/>
                         <a:t>GPS</a:t>
                       </a:r>
                       <a:r>
-                        <a:rPr lang="en-US" baseline="0" dirty="0" smtClean="0"/>
+                        <a:rPr lang="en-US" b="1" baseline="0" dirty="0" smtClean="0"/>
                         <a:t> (global positioning system)</a:t>
                       </a:r>
-                      <a:endParaRPr lang="en-US" dirty="0"/>
+                      <a:endParaRPr lang="en-US" b="1" dirty="0"/>
                     </a:p>
                   </a:txBody>
                   <a:tcPr>
@@ -22753,10 +22734,10 @@
                     <a:p>
                       <a:pPr algn="l"/>
                       <a:r>
-                        <a:rPr lang="en-US" dirty="0" smtClean="0"/>
+                        <a:rPr lang="en-US" b="1" dirty="0" smtClean="0"/>
                         <a:t>Mobile Phone Network</a:t>
                       </a:r>
-                      <a:endParaRPr lang="en-US" dirty="0"/>
+                      <a:endParaRPr lang="en-US" b="1" dirty="0"/>
                     </a:p>
                   </a:txBody>
                   <a:tcPr>
@@ -22813,10 +22794,10 @@
                     <a:p>
                       <a:pPr algn="l"/>
                       <a:r>
-                        <a:rPr lang="en-US" dirty="0" smtClean="0"/>
+                        <a:rPr lang="en-US" b="1" dirty="0" smtClean="0"/>
                         <a:t>WLAN</a:t>
                       </a:r>
-                      <a:endParaRPr lang="en-US" dirty="0"/>
+                      <a:endParaRPr lang="en-US" b="1" dirty="0"/>
                     </a:p>
                   </a:txBody>
                   <a:tcPr>
@@ -22868,10 +22849,10 @@
                     <a:p>
                       <a:pPr algn="l"/>
                       <a:r>
-                        <a:rPr lang="en-US" dirty="0" smtClean="0"/>
+                        <a:rPr lang="en-US" b="1" dirty="0" smtClean="0"/>
                         <a:t>Bluetooth</a:t>
                       </a:r>
-                      <a:endParaRPr lang="en-US" dirty="0"/>
+                      <a:endParaRPr lang="en-US" b="1" dirty="0"/>
                     </a:p>
                   </a:txBody>
                   <a:tcPr>
@@ -22918,14 +22899,14 @@
                     <a:p>
                       <a:pPr algn="l"/>
                       <a:r>
-                        <a:rPr lang="en-US" dirty="0" err="1" smtClean="0"/>
+                        <a:rPr lang="en-US" b="1" dirty="0" err="1" smtClean="0"/>
                         <a:t>Ubisense</a:t>
                       </a:r>
                       <a:r>
-                        <a:rPr lang="en-US" baseline="0" dirty="0" smtClean="0"/>
+                        <a:rPr lang="en-US" b="1" baseline="0" dirty="0" smtClean="0"/>
                         <a:t> Sensor</a:t>
                       </a:r>
-                      <a:endParaRPr lang="en-US" dirty="0"/>
+                      <a:endParaRPr lang="en-US" b="1" dirty="0"/>
                     </a:p>
                   </a:txBody>
                   <a:tcPr>
@@ -26103,7 +26084,7 @@
               </a:r>
               <a:r>
                 <a:rPr lang="en-US" sz="2800" dirty="0" smtClean="0"/>
-                <a:t>Thing</a:t>
+                <a:t>Things</a:t>
               </a:r>
               <a:endParaRPr lang="en-US" sz="2800" dirty="0"/>
             </a:p>

</xml_diff>